<commit_message>
Improvements on accuracy and made a loop through the categories
</commit_message>
<xml_diff>
--- a/presentation final project.pptx
+++ b/presentation final project.pptx
@@ -180,6 +180,10 @@
     </p:ext>
   </p:extLst>
 </p:presentation>
+</file>
+
+<file path=ppt/revisionInfo.xml><?xml version="1.0" encoding="utf-8"?>
+<p1510:revInfo xmlns:a="http://schemas.openxmlformats.org/drawingml/2006/main" xmlns:r="http://schemas.openxmlformats.org/officeDocument/2006/relationships" xmlns:p1510="http://schemas.microsoft.com/office/powerpoint/2015/10/main"/>
 </file>
 
 <file path=ppt/changesInfos/changesInfo1.xml><?xml version="1.0" encoding="utf-8"?>
@@ -403,7 +407,7 @@
           </ac:picMkLst>
         </pc:picChg>
         <pc:picChg chg="add del mod">
-          <ac:chgData name="Daphne Groot" userId="771462a79f1ed076" providerId="LiveId" clId="{0416E947-A9C4-4B44-8AED-B164B29AFA9A}" dt="2017-11-06T13:10:07.054" v="679"/>
+          <ac:chgData name="Daphne Groot" userId="771462a79f1ed076" providerId="LiveId" clId="{0416E947-A9C4-4B44-8AED-B164B29AFA9A}" dt="2017-11-06T13:10:07.054" v="679" actId="1037"/>
           <ac:picMkLst>
             <pc:docMk/>
             <pc:sldMk cId="540581268" sldId="262"/>
@@ -1067,6 +1071,90 @@
     <p:extLst>
       <p:ext uri="{BB962C8B-B14F-4D97-AF65-F5344CB8AC3E}">
         <p14:creationId xmlns:p14="http://schemas.microsoft.com/office/powerpoint/2010/main" val="4226689086"/>
+      </p:ext>
+    </p:extLst>
+  </p:cSld>
+  <p:clrMapOvr>
+    <a:masterClrMapping/>
+  </p:clrMapOvr>
+</p:notes>
+</file>
+
+<file path=ppt/notesSlides/notesSlide2.xml><?xml version="1.0" encoding="utf-8"?>
+<p:notes xmlns:a="http://schemas.openxmlformats.org/drawingml/2006/main" xmlns:r="http://schemas.openxmlformats.org/officeDocument/2006/relationships" xmlns:p="http://schemas.openxmlformats.org/presentationml/2006/main">
+  <p:cSld>
+    <p:spTree>
+      <p:nvGrpSpPr>
+        <p:cNvPr id="1" name=""/>
+        <p:cNvGrpSpPr/>
+        <p:nvPr/>
+      </p:nvGrpSpPr>
+      <p:grpSpPr>
+        <a:xfrm>
+          <a:off x="0" y="0"/>
+          <a:ext cx="0" cy="0"/>
+          <a:chOff x="0" y="0"/>
+          <a:chExt cx="0" cy="0"/>
+        </a:xfrm>
+      </p:grpSpPr>
+      <p:sp>
+        <p:nvSpPr>
+          <p:cNvPr id="2" name="Tijdelijke aanduiding voor dia-afbeelding 1"/>
+          <p:cNvSpPr>
+            <a:spLocks noGrp="1" noRot="1" noChangeAspect="1"/>
+          </p:cNvSpPr>
+          <p:nvPr>
+            <p:ph type="sldImg"/>
+          </p:nvPr>
+        </p:nvSpPr>
+        <p:spPr/>
+      </p:sp>
+      <p:sp>
+        <p:nvSpPr>
+          <p:cNvPr id="3" name="Tijdelijke aanduiding voor notities 2"/>
+          <p:cNvSpPr>
+            <a:spLocks noGrp="1"/>
+          </p:cNvSpPr>
+          <p:nvPr>
+            <p:ph type="body" idx="1"/>
+          </p:nvPr>
+        </p:nvSpPr>
+        <p:spPr/>
+        <p:txBody>
+          <a:bodyPr/>
+          <a:lstStyle/>
+          <a:p>
+            <a:endParaRPr lang="en-US" dirty="0"/>
+          </a:p>
+        </p:txBody>
+      </p:sp>
+      <p:sp>
+        <p:nvSpPr>
+          <p:cNvPr id="4" name="Tijdelijke aanduiding voor dianummer 3"/>
+          <p:cNvSpPr>
+            <a:spLocks noGrp="1"/>
+          </p:cNvSpPr>
+          <p:nvPr>
+            <p:ph type="sldNum" sz="quarter" idx="10"/>
+          </p:nvPr>
+        </p:nvSpPr>
+        <p:spPr/>
+        <p:txBody>
+          <a:bodyPr/>
+          <a:lstStyle/>
+          <a:p>
+            <a:fld id="{CF8C8A45-E877-4464-A156-19523A0C805B}" type="slidenum">
+              <a:rPr lang="nl-NL" smtClean="0"/>
+              <a:t>7</a:t>
+            </a:fld>
+            <a:endParaRPr lang="nl-NL"/>
+          </a:p>
+        </p:txBody>
+      </p:sp>
+    </p:spTree>
+    <p:extLst>
+      <p:ext uri="{BB962C8B-B14F-4D97-AF65-F5344CB8AC3E}">
+        <p14:creationId xmlns:p14="http://schemas.microsoft.com/office/powerpoint/2010/main" val="3765184972"/>
       </p:ext>
     </p:extLst>
   </p:cSld>
@@ -16861,6 +16949,13 @@
             <a:endParaRPr lang="en-GB" dirty="0"/>
           </a:p>
           <a:p>
+            <a:pPr lvl="1"/>
+            <a:r>
+              <a:rPr lang="en-GB" dirty="0"/>
+              <a:t>Spell errors in training data</a:t>
+            </a:r>
+          </a:p>
+          <a:p>
             <a:endParaRPr lang="en-GB" dirty="0"/>
           </a:p>
         </p:txBody>
@@ -17133,7 +17228,7 @@
             <a:pPr lvl="1"/>
             <a:r>
               <a:rPr lang="en-GB" dirty="0"/>
-              <a:t>Bleu</a:t>
+              <a:t>BLEU</a:t>
             </a:r>
           </a:p>
           <a:p>
@@ -17204,7 +17299,7 @@
           <p:nvPr>
             <p:extLst>
               <p:ext uri="{D42A27DB-BD31-4B8C-83A1-F6EECF244321}">
-                <p14:modId xmlns:p14="http://schemas.microsoft.com/office/powerpoint/2010/main" val="2013665346"/>
+                <p14:modId xmlns:p14="http://schemas.microsoft.com/office/powerpoint/2010/main" val="2964705068"/>
               </p:ext>
             </p:extLst>
           </p:nvPr>
@@ -17339,7 +17434,7 @@
                       </a:pPr>
                       <a:r>
                         <a:rPr lang="nl-NL" dirty="0"/>
-                        <a:t>55.9%</a:t>
+                        <a:t>78.4%</a:t>
                       </a:r>
                     </a:p>
                   </a:txBody>
@@ -17400,7 +17495,7 @@
                       </a:pPr>
                       <a:r>
                         <a:rPr lang="nl-NL" dirty="0"/>
-                        <a:t>33.3%</a:t>
+                        <a:t>55.6%</a:t>
                       </a:r>
                     </a:p>
                   </a:txBody>
@@ -17461,7 +17556,7 @@
                       </a:pPr>
                       <a:r>
                         <a:rPr lang="nl-NL" dirty="0"/>
-                        <a:t>56.7%</a:t>
+                        <a:t>60.0%</a:t>
                       </a:r>
                     </a:p>
                   </a:txBody>
@@ -17522,7 +17617,7 @@
                       </a:pPr>
                       <a:r>
                         <a:rPr lang="nl-NL" dirty="0"/>
-                        <a:t>45.2%</a:t>
+                        <a:t>51.6%</a:t>
                       </a:r>
                     </a:p>
                   </a:txBody>
@@ -17651,7 +17746,7 @@
                       </a:pPr>
                       <a:r>
                         <a:rPr lang="nl-NL" dirty="0"/>
-                        <a:t>55.9%</a:t>
+                        <a:t>64.7%</a:t>
                       </a:r>
                     </a:p>
                   </a:txBody>
@@ -17712,7 +17807,7 @@
                       </a:pPr>
                       <a:r>
                         <a:rPr lang="nl-NL" dirty="0"/>
-                        <a:t>60.0%</a:t>
+                        <a:t>80.0%</a:t>
                       </a:r>
                     </a:p>
                   </a:txBody>
@@ -17774,7 +17869,7 @@
                       </a:pPr>
                       <a:r>
                         <a:rPr lang="nl-NL" dirty="0"/>
-                        <a:t>46.9%</a:t>
+                        <a:t>53.13%</a:t>
                       </a:r>
                     </a:p>
                   </a:txBody>
@@ -17835,7 +17930,7 @@
                       </a:pPr>
                       <a:r>
                         <a:rPr lang="nl-NL" dirty="0"/>
-                        <a:t>42.9%</a:t>
+                        <a:t>57.1%</a:t>
                       </a:r>
                     </a:p>
                   </a:txBody>
@@ -17897,7 +17992,7 @@
                       </a:pPr>
                       <a:r>
                         <a:rPr lang="nl-NL" dirty="0"/>
-                        <a:t>60.7%</a:t>
+                        <a:t>67.9%</a:t>
                       </a:r>
                     </a:p>
                   </a:txBody>
@@ -17949,318 +18044,6 @@
           </a:p>
         </p:txBody>
       </p:sp>
-      <p:grpSp>
-        <p:nvGrpSpPr>
-          <p:cNvPr id="17" name="Groep 16">
-            <a:extLst>
-              <a:ext uri="{FF2B5EF4-FFF2-40B4-BE49-F238E27FC236}">
-                <a16:creationId xmlns:a16="http://schemas.microsoft.com/office/drawing/2014/main" id="{F35F9AD8-A6B2-4C3C-88F6-390655E6A389}"/>
-              </a:ext>
-            </a:extLst>
-          </p:cNvPr>
-          <p:cNvGrpSpPr/>
-          <p:nvPr/>
-        </p:nvGrpSpPr>
-        <p:grpSpPr>
-          <a:xfrm>
-            <a:off x="2630326" y="1906867"/>
-            <a:ext cx="2540103" cy="4504794"/>
-            <a:chOff x="4336286" y="1523405"/>
-            <a:chExt cx="2540103" cy="4504794"/>
-          </a:xfrm>
-        </p:grpSpPr>
-        <p:pic>
-          <p:nvPicPr>
-            <p:cNvPr id="5" name="Afbeelding 4">
-              <a:extLst>
-                <a:ext uri="{FF2B5EF4-FFF2-40B4-BE49-F238E27FC236}">
-                  <a16:creationId xmlns:a16="http://schemas.microsoft.com/office/drawing/2014/main" id="{2E79EEAA-DF43-43B6-A233-EFD108ED4886}"/>
-                </a:ext>
-              </a:extLst>
-            </p:cNvPr>
-            <p:cNvPicPr>
-              <a:picLocks noChangeAspect="1"/>
-            </p:cNvPicPr>
-            <p:nvPr/>
-          </p:nvPicPr>
-          <p:blipFill>
-            <a:blip r:embed="rId2"/>
-            <a:stretch>
-              <a:fillRect/>
-            </a:stretch>
-          </p:blipFill>
-          <p:spPr>
-            <a:xfrm>
-              <a:off x="4336286" y="3856246"/>
-              <a:ext cx="2405453" cy="324000"/>
-            </a:xfrm>
-            <a:prstGeom prst="rect">
-              <a:avLst/>
-            </a:prstGeom>
-          </p:spPr>
-        </p:pic>
-        <p:pic>
-          <p:nvPicPr>
-            <p:cNvPr id="8" name="Afbeelding 7">
-              <a:extLst>
-                <a:ext uri="{FF2B5EF4-FFF2-40B4-BE49-F238E27FC236}">
-                  <a16:creationId xmlns:a16="http://schemas.microsoft.com/office/drawing/2014/main" id="{B0AE4405-5A1D-4E3C-820F-5BC636EC07AC}"/>
-                </a:ext>
-              </a:extLst>
-            </p:cNvPr>
-            <p:cNvPicPr>
-              <a:picLocks noChangeAspect="1"/>
-            </p:cNvPicPr>
-            <p:nvPr/>
-          </p:nvPicPr>
-          <p:blipFill>
-            <a:blip r:embed="rId3"/>
-            <a:stretch>
-              <a:fillRect/>
-            </a:stretch>
-          </p:blipFill>
-          <p:spPr>
-            <a:xfrm>
-              <a:off x="4336643" y="2904795"/>
-              <a:ext cx="2230972" cy="324000"/>
-            </a:xfrm>
-            <a:prstGeom prst="rect">
-              <a:avLst/>
-            </a:prstGeom>
-          </p:spPr>
-        </p:pic>
-        <p:grpSp>
-          <p:nvGrpSpPr>
-            <p:cNvPr id="14" name="Groep 13">
-              <a:extLst>
-                <a:ext uri="{FF2B5EF4-FFF2-40B4-BE49-F238E27FC236}">
-                  <a16:creationId xmlns:a16="http://schemas.microsoft.com/office/drawing/2014/main" id="{E11BEE4A-6C0B-4922-ABCC-3D75AD2E00C5}"/>
-                </a:ext>
-              </a:extLst>
-            </p:cNvPr>
-            <p:cNvGrpSpPr/>
-            <p:nvPr/>
-          </p:nvGrpSpPr>
-          <p:grpSpPr>
-            <a:xfrm>
-              <a:off x="4336286" y="1523405"/>
-              <a:ext cx="2540103" cy="4504794"/>
-              <a:chOff x="4336286" y="1523405"/>
-              <a:chExt cx="2540103" cy="4504794"/>
-            </a:xfrm>
-          </p:grpSpPr>
-          <p:pic>
-            <p:nvPicPr>
-              <p:cNvPr id="4" name="Afbeelding 3">
-                <a:extLst>
-                  <a:ext uri="{FF2B5EF4-FFF2-40B4-BE49-F238E27FC236}">
-                    <a16:creationId xmlns:a16="http://schemas.microsoft.com/office/drawing/2014/main" id="{63618AAC-76D6-4910-92D8-2B037FA01483}"/>
-                  </a:ext>
-                </a:extLst>
-              </p:cNvPr>
-              <p:cNvPicPr>
-                <a:picLocks noChangeAspect="1"/>
-              </p:cNvPicPr>
-              <p:nvPr/>
-            </p:nvPicPr>
-            <p:blipFill>
-              <a:blip r:embed="rId4"/>
-              <a:stretch>
-                <a:fillRect/>
-              </a:stretch>
-            </p:blipFill>
-            <p:spPr>
-              <a:xfrm>
-                <a:off x="4336644" y="2447201"/>
-                <a:ext cx="2366179" cy="324000"/>
-              </a:xfrm>
-              <a:prstGeom prst="rect">
-                <a:avLst/>
-              </a:prstGeom>
-            </p:spPr>
-          </p:pic>
-          <p:pic>
-            <p:nvPicPr>
-              <p:cNvPr id="6" name="Afbeelding 5">
-                <a:extLst>
-                  <a:ext uri="{FF2B5EF4-FFF2-40B4-BE49-F238E27FC236}">
-                    <a16:creationId xmlns:a16="http://schemas.microsoft.com/office/drawing/2014/main" id="{0424E0B0-8279-49BD-9DA7-00CB9F5AF14F}"/>
-                  </a:ext>
-                </a:extLst>
-              </p:cNvPr>
-              <p:cNvPicPr>
-                <a:picLocks noChangeAspect="1"/>
-              </p:cNvPicPr>
-              <p:nvPr/>
-            </p:nvPicPr>
-            <p:blipFill>
-              <a:blip r:embed="rId5"/>
-              <a:stretch>
-                <a:fillRect/>
-              </a:stretch>
-            </p:blipFill>
-            <p:spPr>
-              <a:xfrm>
-                <a:off x="4336643" y="1523405"/>
-                <a:ext cx="2249486" cy="324000"/>
-              </a:xfrm>
-              <a:prstGeom prst="rect">
-                <a:avLst/>
-              </a:prstGeom>
-            </p:spPr>
-          </p:pic>
-          <p:pic>
-            <p:nvPicPr>
-              <p:cNvPr id="7" name="Afbeelding 6">
-                <a:extLst>
-                  <a:ext uri="{FF2B5EF4-FFF2-40B4-BE49-F238E27FC236}">
-                    <a16:creationId xmlns:a16="http://schemas.microsoft.com/office/drawing/2014/main" id="{83E85AAB-AA1A-4200-9746-8F4424598496}"/>
-                  </a:ext>
-                </a:extLst>
-              </p:cNvPr>
-              <p:cNvPicPr>
-                <a:picLocks noChangeAspect="1"/>
-              </p:cNvPicPr>
-              <p:nvPr/>
-            </p:nvPicPr>
-            <p:blipFill>
-              <a:blip r:embed="rId6"/>
-              <a:stretch>
-                <a:fillRect/>
-              </a:stretch>
-            </p:blipFill>
-            <p:spPr>
-              <a:xfrm>
-                <a:off x="4336643" y="1996823"/>
-                <a:ext cx="2539746" cy="324000"/>
-              </a:xfrm>
-              <a:prstGeom prst="rect">
-                <a:avLst/>
-              </a:prstGeom>
-            </p:spPr>
-          </p:pic>
-          <p:pic>
-            <p:nvPicPr>
-              <p:cNvPr id="9" name="Afbeelding 8">
-                <a:extLst>
-                  <a:ext uri="{FF2B5EF4-FFF2-40B4-BE49-F238E27FC236}">
-                    <a16:creationId xmlns:a16="http://schemas.microsoft.com/office/drawing/2014/main" id="{B94F6CD8-E772-408C-B810-387D60FE0D65}"/>
-                  </a:ext>
-                </a:extLst>
-              </p:cNvPr>
-              <p:cNvPicPr>
-                <a:picLocks noChangeAspect="1"/>
-              </p:cNvPicPr>
-              <p:nvPr/>
-            </p:nvPicPr>
-            <p:blipFill>
-              <a:blip r:embed="rId7"/>
-              <a:stretch>
-                <a:fillRect/>
-              </a:stretch>
-            </p:blipFill>
-            <p:spPr>
-              <a:xfrm>
-                <a:off x="4336286" y="4325431"/>
-                <a:ext cx="2306122" cy="324000"/>
-              </a:xfrm>
-              <a:prstGeom prst="rect">
-                <a:avLst/>
-              </a:prstGeom>
-            </p:spPr>
-          </p:pic>
-          <p:pic>
-            <p:nvPicPr>
-              <p:cNvPr id="10" name="Afbeelding 9">
-                <a:extLst>
-                  <a:ext uri="{FF2B5EF4-FFF2-40B4-BE49-F238E27FC236}">
-                    <a16:creationId xmlns:a16="http://schemas.microsoft.com/office/drawing/2014/main" id="{7E1AF611-2F16-4B3E-B3E9-27F25C9603FF}"/>
-                  </a:ext>
-                </a:extLst>
-              </p:cNvPr>
-              <p:cNvPicPr>
-                <a:picLocks noChangeAspect="1"/>
-              </p:cNvPicPr>
-              <p:nvPr/>
-            </p:nvPicPr>
-            <p:blipFill>
-              <a:blip r:embed="rId8"/>
-              <a:stretch>
-                <a:fillRect/>
-              </a:stretch>
-            </p:blipFill>
-            <p:spPr>
-              <a:xfrm>
-                <a:off x="4336286" y="4806442"/>
-                <a:ext cx="2450252" cy="324000"/>
-              </a:xfrm>
-              <a:prstGeom prst="rect">
-                <a:avLst/>
-              </a:prstGeom>
-            </p:spPr>
-          </p:pic>
-          <p:pic>
-            <p:nvPicPr>
-              <p:cNvPr id="11" name="Afbeelding 10">
-                <a:extLst>
-                  <a:ext uri="{FF2B5EF4-FFF2-40B4-BE49-F238E27FC236}">
-                    <a16:creationId xmlns:a16="http://schemas.microsoft.com/office/drawing/2014/main" id="{2F5E55BD-4B60-4F73-BCA4-CD882A9F13E8}"/>
-                  </a:ext>
-                </a:extLst>
-              </p:cNvPr>
-              <p:cNvPicPr>
-                <a:picLocks noChangeAspect="1"/>
-              </p:cNvPicPr>
-              <p:nvPr/>
-            </p:nvPicPr>
-            <p:blipFill>
-              <a:blip r:embed="rId9"/>
-              <a:stretch>
-                <a:fillRect/>
-              </a:stretch>
-            </p:blipFill>
-            <p:spPr>
-              <a:xfrm>
-                <a:off x="4336286" y="5266521"/>
-                <a:ext cx="2395634" cy="324000"/>
-              </a:xfrm>
-              <a:prstGeom prst="rect">
-                <a:avLst/>
-              </a:prstGeom>
-            </p:spPr>
-          </p:pic>
-          <p:pic>
-            <p:nvPicPr>
-              <p:cNvPr id="12" name="Afbeelding 11">
-                <a:extLst>
-                  <a:ext uri="{FF2B5EF4-FFF2-40B4-BE49-F238E27FC236}">
-                    <a16:creationId xmlns:a16="http://schemas.microsoft.com/office/drawing/2014/main" id="{C8C1E0A1-6195-42BD-A6EF-1AF2EA4AC0BD}"/>
-                  </a:ext>
-                </a:extLst>
-              </p:cNvPr>
-              <p:cNvPicPr>
-                <a:picLocks noChangeAspect="1"/>
-              </p:cNvPicPr>
-              <p:nvPr/>
-            </p:nvPicPr>
-            <p:blipFill>
-              <a:blip r:embed="rId10"/>
-              <a:stretch>
-                <a:fillRect/>
-              </a:stretch>
-            </p:blipFill>
-            <p:spPr>
-              <a:xfrm>
-                <a:off x="4336287" y="5704199"/>
-                <a:ext cx="2325181" cy="324000"/>
-              </a:xfrm>
-              <a:prstGeom prst="rect">
-                <a:avLst/>
-              </a:prstGeom>
-            </p:spPr>
-          </p:pic>
-        </p:grpSp>
-      </p:grpSp>
       <p:sp>
         <p:nvSpPr>
           <p:cNvPr id="18" name="Tekstvak 17">
@@ -18275,8 +18058,8 @@
         </p:nvSpPr>
         <p:spPr>
           <a:xfrm>
-            <a:off x="6850789" y="1376997"/>
-            <a:ext cx="1877961" cy="1754326"/>
+            <a:off x="6674000" y="1376997"/>
+            <a:ext cx="2538580" cy="1785104"/>
           </a:xfrm>
           <a:prstGeom prst="rect">
             <a:avLst/>
@@ -18291,16 +18074,28 @@
           <a:p>
             <a:r>
               <a:rPr lang="nl-NL" dirty="0"/>
-              <a:t>Best: </a:t>
-            </a:r>
-            <a:r>
-              <a:rPr lang="nl-NL" dirty="0" err="1"/>
-              <a:t>WrittenWork</a:t>
-            </a:r>
-            <a:endParaRPr lang="nl-NL" dirty="0"/>
-          </a:p>
-          <a:p>
-            <a:endParaRPr lang="nl-NL" dirty="0"/>
+              <a:t>Best:</a:t>
+            </a:r>
+          </a:p>
+          <a:p>
+            <a:pPr marL="285750" indent="-285750">
+              <a:buFont typeface="Arial" panose="020B0604020202020204" pitchFamily="34" charset="0"/>
+              <a:buChar char="•"/>
+            </a:pPr>
+            <a:r>
+              <a:rPr lang="nl-NL" sz="1400" dirty="0"/>
+              <a:t>Airport</a:t>
+            </a:r>
+          </a:p>
+          <a:p>
+            <a:pPr marL="285750" indent="-285750">
+              <a:buFont typeface="Arial" panose="020B0604020202020204" pitchFamily="34" charset="0"/>
+              <a:buChar char="•"/>
+            </a:pPr>
+            <a:r>
+              <a:rPr lang="nl-NL" sz="1400" dirty="0"/>
+              <a:t>Monument</a:t>
+            </a:r>
           </a:p>
           <a:p>
             <a:r>
@@ -18309,16 +18104,301 @@
             </a:r>
           </a:p>
           <a:p>
-            <a:r>
-              <a:rPr lang="nl-NL" dirty="0"/>
-              <a:t>Astronaut</a:t>
-            </a:r>
+            <a:pPr marL="285750" indent="-285750">
+              <a:buFont typeface="Arial" panose="020B0604020202020204" pitchFamily="34" charset="0"/>
+              <a:buChar char="•"/>
+            </a:pPr>
+            <a:r>
+              <a:rPr lang="nl-NL" sz="1400" dirty="0"/>
+              <a:t>City</a:t>
+            </a:r>
+          </a:p>
+          <a:p>
+            <a:pPr marL="285750" indent="-285750">
+              <a:buFont typeface="Arial" panose="020B0604020202020204" pitchFamily="34" charset="0"/>
+              <a:buChar char="•"/>
+            </a:pPr>
+            <a:r>
+              <a:rPr lang="nl-NL" sz="1400" dirty="0" err="1"/>
+              <a:t>SportsTeam</a:t>
+            </a:r>
+            <a:endParaRPr lang="nl-NL" sz="1400" dirty="0"/>
           </a:p>
           <a:p>
             <a:endParaRPr lang="nl-NL" dirty="0"/>
           </a:p>
         </p:txBody>
       </p:sp>
+      <p:pic>
+        <p:nvPicPr>
+          <p:cNvPr id="30" name="Afbeelding 29">
+            <a:extLst>
+              <a:ext uri="{FF2B5EF4-FFF2-40B4-BE49-F238E27FC236}">
+                <a16:creationId xmlns:a16="http://schemas.microsoft.com/office/drawing/2014/main" id="{A8FCE313-37E0-424F-9AF2-5AF478F2C8FC}"/>
+              </a:ext>
+            </a:extLst>
+          </p:cNvPr>
+          <p:cNvPicPr>
+            <a:picLocks noChangeAspect="1"/>
+          </p:cNvPicPr>
+          <p:nvPr/>
+        </p:nvPicPr>
+        <p:blipFill>
+          <a:blip r:embed="rId3"/>
+          <a:stretch>
+            <a:fillRect/>
+          </a:stretch>
+        </p:blipFill>
+        <p:spPr>
+          <a:xfrm>
+            <a:off x="2135914" y="1911797"/>
+            <a:ext cx="2686050" cy="323850"/>
+          </a:xfrm>
+          <a:prstGeom prst="rect">
+            <a:avLst/>
+          </a:prstGeom>
+        </p:spPr>
+      </p:pic>
+      <p:pic>
+        <p:nvPicPr>
+          <p:cNvPr id="31" name="Afbeelding 30">
+            <a:extLst>
+              <a:ext uri="{FF2B5EF4-FFF2-40B4-BE49-F238E27FC236}">
+                <a16:creationId xmlns:a16="http://schemas.microsoft.com/office/drawing/2014/main" id="{4298DEC9-1CAF-41BA-B3CB-186D55F602D2}"/>
+              </a:ext>
+            </a:extLst>
+          </p:cNvPr>
+          <p:cNvPicPr>
+            <a:picLocks noChangeAspect="1"/>
+          </p:cNvPicPr>
+          <p:nvPr/>
+        </p:nvPicPr>
+        <p:blipFill>
+          <a:blip r:embed="rId4"/>
+          <a:stretch>
+            <a:fillRect/>
+          </a:stretch>
+        </p:blipFill>
+        <p:spPr>
+          <a:xfrm>
+            <a:off x="2135914" y="2386657"/>
+            <a:ext cx="2647950" cy="352425"/>
+          </a:xfrm>
+          <a:prstGeom prst="rect">
+            <a:avLst/>
+          </a:prstGeom>
+        </p:spPr>
+      </p:pic>
+      <p:pic>
+        <p:nvPicPr>
+          <p:cNvPr id="32" name="Afbeelding 31">
+            <a:extLst>
+              <a:ext uri="{FF2B5EF4-FFF2-40B4-BE49-F238E27FC236}">
+                <a16:creationId xmlns:a16="http://schemas.microsoft.com/office/drawing/2014/main" id="{6A505E12-31E8-4BA7-B10A-792262D597C4}"/>
+              </a:ext>
+            </a:extLst>
+          </p:cNvPr>
+          <p:cNvPicPr>
+            <a:picLocks noChangeAspect="1"/>
+          </p:cNvPicPr>
+          <p:nvPr/>
+        </p:nvPicPr>
+        <p:blipFill>
+          <a:blip r:embed="rId5"/>
+          <a:stretch>
+            <a:fillRect/>
+          </a:stretch>
+        </p:blipFill>
+        <p:spPr>
+          <a:xfrm>
+            <a:off x="2131151" y="2832545"/>
+            <a:ext cx="2628900" cy="361950"/>
+          </a:xfrm>
+          <a:prstGeom prst="rect">
+            <a:avLst/>
+          </a:prstGeom>
+        </p:spPr>
+      </p:pic>
+      <p:pic>
+        <p:nvPicPr>
+          <p:cNvPr id="33" name="Afbeelding 32">
+            <a:extLst>
+              <a:ext uri="{FF2B5EF4-FFF2-40B4-BE49-F238E27FC236}">
+                <a16:creationId xmlns:a16="http://schemas.microsoft.com/office/drawing/2014/main" id="{84B3CA99-2EC1-48E7-B245-D15A923A0C36}"/>
+              </a:ext>
+            </a:extLst>
+          </p:cNvPr>
+          <p:cNvPicPr>
+            <a:picLocks noChangeAspect="1"/>
+          </p:cNvPicPr>
+          <p:nvPr/>
+        </p:nvPicPr>
+        <p:blipFill>
+          <a:blip r:embed="rId6"/>
+          <a:stretch>
+            <a:fillRect/>
+          </a:stretch>
+        </p:blipFill>
+        <p:spPr>
+          <a:xfrm>
+            <a:off x="2131151" y="3335980"/>
+            <a:ext cx="2657475" cy="333375"/>
+          </a:xfrm>
+          <a:prstGeom prst="rect">
+            <a:avLst/>
+          </a:prstGeom>
+        </p:spPr>
+      </p:pic>
+      <p:pic>
+        <p:nvPicPr>
+          <p:cNvPr id="34" name="Afbeelding 33">
+            <a:extLst>
+              <a:ext uri="{FF2B5EF4-FFF2-40B4-BE49-F238E27FC236}">
+                <a16:creationId xmlns:a16="http://schemas.microsoft.com/office/drawing/2014/main" id="{D00349B3-01C3-4855-BE58-5CA97227EF25}"/>
+              </a:ext>
+            </a:extLst>
+          </p:cNvPr>
+          <p:cNvPicPr>
+            <a:picLocks noChangeAspect="1"/>
+          </p:cNvPicPr>
+          <p:nvPr/>
+        </p:nvPicPr>
+        <p:blipFill>
+          <a:blip r:embed="rId7"/>
+          <a:stretch>
+            <a:fillRect/>
+          </a:stretch>
+        </p:blipFill>
+        <p:spPr>
+          <a:xfrm>
+            <a:off x="2131150" y="4266253"/>
+            <a:ext cx="2657475" cy="323850"/>
+          </a:xfrm>
+          <a:prstGeom prst="rect">
+            <a:avLst/>
+          </a:prstGeom>
+        </p:spPr>
+      </p:pic>
+      <p:pic>
+        <p:nvPicPr>
+          <p:cNvPr id="35" name="Afbeelding 34">
+            <a:extLst>
+              <a:ext uri="{FF2B5EF4-FFF2-40B4-BE49-F238E27FC236}">
+                <a16:creationId xmlns:a16="http://schemas.microsoft.com/office/drawing/2014/main" id="{1FCA2FA0-32C4-4D5D-A249-3DD080B3DA83}"/>
+              </a:ext>
+            </a:extLst>
+          </p:cNvPr>
+          <p:cNvPicPr>
+            <a:picLocks noChangeAspect="1"/>
+          </p:cNvPicPr>
+          <p:nvPr/>
+        </p:nvPicPr>
+        <p:blipFill>
+          <a:blip r:embed="rId8"/>
+          <a:stretch>
+            <a:fillRect/>
+          </a:stretch>
+        </p:blipFill>
+        <p:spPr>
+          <a:xfrm>
+            <a:off x="2131150" y="4721666"/>
+            <a:ext cx="1971675" cy="323850"/>
+          </a:xfrm>
+          <a:prstGeom prst="rect">
+            <a:avLst/>
+          </a:prstGeom>
+        </p:spPr>
+      </p:pic>
+      <p:pic>
+        <p:nvPicPr>
+          <p:cNvPr id="36" name="Afbeelding 35">
+            <a:extLst>
+              <a:ext uri="{FF2B5EF4-FFF2-40B4-BE49-F238E27FC236}">
+                <a16:creationId xmlns:a16="http://schemas.microsoft.com/office/drawing/2014/main" id="{883EDF1D-2335-4462-9D5C-B5F7C041D585}"/>
+              </a:ext>
+            </a:extLst>
+          </p:cNvPr>
+          <p:cNvPicPr>
+            <a:picLocks noChangeAspect="1"/>
+          </p:cNvPicPr>
+          <p:nvPr/>
+        </p:nvPicPr>
+        <p:blipFill>
+          <a:blip r:embed="rId9"/>
+          <a:stretch>
+            <a:fillRect/>
+          </a:stretch>
+        </p:blipFill>
+        <p:spPr>
+          <a:xfrm>
+            <a:off x="2131150" y="5695572"/>
+            <a:ext cx="2619375" cy="276225"/>
+          </a:xfrm>
+          <a:prstGeom prst="rect">
+            <a:avLst/>
+          </a:prstGeom>
+        </p:spPr>
+      </p:pic>
+      <p:pic>
+        <p:nvPicPr>
+          <p:cNvPr id="37" name="Afbeelding 36">
+            <a:extLst>
+              <a:ext uri="{FF2B5EF4-FFF2-40B4-BE49-F238E27FC236}">
+                <a16:creationId xmlns:a16="http://schemas.microsoft.com/office/drawing/2014/main" id="{2C63DF1D-2F7A-4D93-AF45-D8CEBA79D75B}"/>
+              </a:ext>
+            </a:extLst>
+          </p:cNvPr>
+          <p:cNvPicPr>
+            <a:picLocks noChangeAspect="1"/>
+          </p:cNvPicPr>
+          <p:nvPr/>
+        </p:nvPicPr>
+        <p:blipFill>
+          <a:blip r:embed="rId10"/>
+          <a:stretch>
+            <a:fillRect/>
+          </a:stretch>
+        </p:blipFill>
+        <p:spPr>
+          <a:xfrm>
+            <a:off x="2131150" y="5198406"/>
+            <a:ext cx="2667000" cy="295275"/>
+          </a:xfrm>
+          <a:prstGeom prst="rect">
+            <a:avLst/>
+          </a:prstGeom>
+        </p:spPr>
+      </p:pic>
+      <p:pic>
+        <p:nvPicPr>
+          <p:cNvPr id="38" name="Afbeelding 37">
+            <a:extLst>
+              <a:ext uri="{FF2B5EF4-FFF2-40B4-BE49-F238E27FC236}">
+                <a16:creationId xmlns:a16="http://schemas.microsoft.com/office/drawing/2014/main" id="{9204BF18-0F77-4C0C-98F1-04EB1920FFF7}"/>
+              </a:ext>
+            </a:extLst>
+          </p:cNvPr>
+          <p:cNvPicPr>
+            <a:picLocks noChangeAspect="1"/>
+          </p:cNvPicPr>
+          <p:nvPr/>
+        </p:nvPicPr>
+        <p:blipFill>
+          <a:blip r:embed="rId11"/>
+          <a:stretch>
+            <a:fillRect/>
+          </a:stretch>
+        </p:blipFill>
+        <p:spPr>
+          <a:xfrm>
+            <a:off x="2115030" y="6117274"/>
+            <a:ext cx="2647950" cy="371475"/>
+          </a:xfrm>
+          <a:prstGeom prst="rect">
+            <a:avLst/>
+          </a:prstGeom>
+        </p:spPr>
+      </p:pic>
     </p:spTree>
     <p:extLst>
       <p:ext uri="{BB962C8B-B14F-4D97-AF65-F5344CB8AC3E}">

</xml_diff>